<commit_message>
Small edit to specify Vectorizer
</commit_message>
<xml_diff>
--- a/Jeopardy_Questions.pptx
+++ b/Jeopardy_Questions.pptx
@@ -14172,7 +14172,7 @@
         </p:spPr>
         <p:txBody>
           <a:bodyPr>
-            <a:normAutofit lnSpcReduction="10000"/>
+            <a:normAutofit fontScale="92500" lnSpcReduction="10000"/>
           </a:bodyPr>
           <a:lstStyle/>
           <a:p>
@@ -14245,6 +14245,13 @@
             <a:r>
               <a:rPr lang="en-US" dirty="0"/>
               <a:t>Algo: NMF</a:t>
+            </a:r>
+          </a:p>
+          <a:p>
+            <a:pPr lvl="1"/>
+            <a:r>
+              <a:rPr lang="en-US" dirty="0"/>
+              <a:t>Vectorizer: TFIDF</a:t>
             </a:r>
           </a:p>
         </p:txBody>

</xml_diff>